<commit_message>
Some Minor Fixes: Feedback Sameer
</commit_message>
<xml_diff>
--- a/app/files/HTML.pptx
+++ b/app/files/HTML.pptx
@@ -5605,7 +5605,7 @@
         </p:spPr>
         <p:txBody>
           <a:bodyPr>
-            <a:normAutofit lnSpcReduction="10000"/>
+            <a:normAutofit fontScale="92500" lnSpcReduction="20000"/>
           </a:bodyPr>
           <a:lstStyle/>
           <a:p>
@@ -5700,7 +5700,16 @@
             </a:pPr>
             <a:r>
               <a:rPr lang="en-US" dirty="0" smtClean="0"/>
-              <a:t>&lt;sub&gt;&lt;/sup&gt;</a:t>
+              <a:t>&lt;sub&gt;&lt;/sub&gt;</a:t>
+            </a:r>
+          </a:p>
+          <a:p>
+            <a:pPr marL="0" indent="0">
+              <a:buNone/>
+            </a:pPr>
+            <a:r>
+              <a:rPr lang="en-US" dirty="0" smtClean="0"/>
+              <a:t>&lt;sup&gt;&lt;/sup&gt;</a:t>
             </a:r>
           </a:p>
           <a:p>

</xml_diff>